<commit_message>
PPT modificado (+ notas)
Aguarda aprovação
</commit_message>
<xml_diff>
--- a/1ªFase/LI4-Grupo6-Fase1.pptx
+++ b/1ªFase/LI4-Grupo6-Fase1.pptx
@@ -1460,31 +1460,31 @@
     </dgm:pt>
   </dgm:ptLst>
   <dgm:cxnLst>
+    <dgm:cxn modelId="{F122E652-67A7-4334-B34C-88BFA399D39B}" type="presOf" srcId="{72EBABCD-A694-46CD-A074-C9CFEAA3A3EB}" destId="{37686E1C-FB33-4701-9F70-50D3E1BF47BD}" srcOrd="1" destOrd="0" presId="urn:microsoft.com/office/officeart/2005/8/layout/radial5"/>
+    <dgm:cxn modelId="{B546F47C-2BD0-4FC0-97B4-CD1BB28DCE4F}" type="presOf" srcId="{90669A4F-190D-4C73-AA80-0F54281701A1}" destId="{68EFFC91-B051-4BF3-90C6-4A4BD7F1D3CE}" srcOrd="1" destOrd="0" presId="urn:microsoft.com/office/officeart/2005/8/layout/radial5"/>
+    <dgm:cxn modelId="{21457BF2-7EE9-4E84-82F3-4EFC3880C900}" type="presOf" srcId="{D2F9420E-3E2E-46BD-A80B-29E2424D5A64}" destId="{C0F774C3-6911-451D-9EDA-A7E7C3E7C701}" srcOrd="0" destOrd="3" presId="urn:microsoft.com/office/officeart/2005/8/layout/radial5"/>
+    <dgm:cxn modelId="{0D80A71E-88DD-425D-AA4A-5847B61AF8D9}" type="presOf" srcId="{7900B2A5-9AE7-46AA-8868-DC204892F73A}" destId="{D1E67752-51AF-4472-AD44-35AEE8E1B9DB}" srcOrd="0" destOrd="0" presId="urn:microsoft.com/office/officeart/2005/8/layout/radial5"/>
+    <dgm:cxn modelId="{0A45F097-A2F1-43CA-89C2-C3C067BAEA37}" srcId="{2857681A-C08C-4ACC-B2D4-A4A8D80F63F6}" destId="{391CA999-2D3D-480F-8FFE-94985539FB61}" srcOrd="2" destOrd="0" parTransId="{72EBABCD-A694-46CD-A074-C9CFEAA3A3EB}" sibTransId="{2E7A4A67-3A0C-4AC0-9173-D9A7D240C226}"/>
+    <dgm:cxn modelId="{3CB3F05B-EFBC-4D18-AE21-715798D9F7B5}" srcId="{BA30CB08-C27E-4176-9DC6-44B8F3045D4D}" destId="{D2F9420E-3E2E-46BD-A80B-29E2424D5A64}" srcOrd="2" destOrd="0" parTransId="{C4BA4B62-A662-49BC-9D1A-58AAC77A135E}" sibTransId="{E4EF8C97-C403-48F9-BFB2-2556C8A82C47}"/>
+    <dgm:cxn modelId="{6FDEA8F9-71EC-4A3D-89D8-5AB800226D75}" type="presOf" srcId="{B2F49888-A987-4C1F-8B6A-057D77BE65FA}" destId="{C4D1BB34-70D8-4EF8-BFC2-AA6246655B35}" srcOrd="0" destOrd="0" presId="urn:microsoft.com/office/officeart/2005/8/layout/radial5"/>
+    <dgm:cxn modelId="{D0881804-0E72-417E-BF89-A43F45A0D91B}" type="presOf" srcId="{2857681A-C08C-4ACC-B2D4-A4A8D80F63F6}" destId="{9E6E3828-A769-4642-90F4-6CC29F79FE54}" srcOrd="0" destOrd="0" presId="urn:microsoft.com/office/officeart/2005/8/layout/radial5"/>
+    <dgm:cxn modelId="{71B11EC1-3175-4C27-A1A4-DDFDDB810599}" srcId="{2857681A-C08C-4ACC-B2D4-A4A8D80F63F6}" destId="{B2F49888-A987-4C1F-8B6A-057D77BE65FA}" srcOrd="3" destOrd="0" parTransId="{90669A4F-190D-4C73-AA80-0F54281701A1}" sibTransId="{F4213411-7083-4B4C-A8CF-2D93D3FF83EB}"/>
+    <dgm:cxn modelId="{BB1888FF-F6B6-4AED-850F-F4B4F328F4D5}" type="presOf" srcId="{72EBABCD-A694-46CD-A074-C9CFEAA3A3EB}" destId="{E3278750-3545-41D0-9098-49EF51C45F2A}" srcOrd="0" destOrd="0" presId="urn:microsoft.com/office/officeart/2005/8/layout/radial5"/>
+    <dgm:cxn modelId="{15F115E3-443F-4D4C-9A0D-F731F3C48025}" type="presOf" srcId="{4940A39E-1769-4461-A9C0-780344A73B93}" destId="{50083348-D83D-4625-BDCE-0B82C4D2C9D7}" srcOrd="0" destOrd="0" presId="urn:microsoft.com/office/officeart/2005/8/layout/radial5"/>
+    <dgm:cxn modelId="{B266AE08-8E20-480C-B2F1-639B4B5CBE4F}" type="presOf" srcId="{E4605E99-D788-40CC-B84F-B096F3844303}" destId="{42CDD322-C3FE-40C7-A54E-55B560603AE9}" srcOrd="0" destOrd="0" presId="urn:microsoft.com/office/officeart/2005/8/layout/radial5"/>
+    <dgm:cxn modelId="{102ABBC3-959C-4A00-B593-2A88CC293F56}" srcId="{BA30CB08-C27E-4176-9DC6-44B8F3045D4D}" destId="{3EDF8D53-410C-4268-9472-D8776C4375CE}" srcOrd="1" destOrd="0" parTransId="{9845E75B-8E16-4BAB-8BFB-F85057241444}" sibTransId="{54593402-1004-41D8-9780-4493DE1FB46D}"/>
+    <dgm:cxn modelId="{9E00953F-80C6-4E38-802D-4459082E920E}" srcId="{BA30CB08-C27E-4176-9DC6-44B8F3045D4D}" destId="{19B2ED47-192C-43D0-B91B-04AD18257B1C}" srcOrd="0" destOrd="0" parTransId="{0B0D8767-681D-4FC8-A9BD-09EE33A0AE94}" sibTransId="{DDE0FFDE-0BC5-434B-B1E4-FF31FB58390D}"/>
+    <dgm:cxn modelId="{462B633D-DFE9-4F69-BBB9-3D3832CC6D34}" type="presOf" srcId="{391CA999-2D3D-480F-8FFE-94985539FB61}" destId="{F4821AD9-0E74-4C87-BF54-53D7672E1C1E}" srcOrd="0" destOrd="0" presId="urn:microsoft.com/office/officeart/2005/8/layout/radial5"/>
+    <dgm:cxn modelId="{E2BD91FC-9DE3-41E8-B828-DC5F37168DB8}" type="presOf" srcId="{BD6BC54F-ECB2-46DC-B744-FC1AA22E6916}" destId="{DD2937F4-E937-4C1A-AD1B-666B3DA7714F}" srcOrd="1" destOrd="0" presId="urn:microsoft.com/office/officeart/2005/8/layout/radial5"/>
+    <dgm:cxn modelId="{4CD10723-1398-4FB8-A48F-FDA3A5B38C56}" type="presOf" srcId="{BD6BC54F-ECB2-46DC-B744-FC1AA22E6916}" destId="{B93BD03F-25A2-4FB8-88CF-D81B31C593BB}" srcOrd="0" destOrd="0" presId="urn:microsoft.com/office/officeart/2005/8/layout/radial5"/>
+    <dgm:cxn modelId="{9A6BCB13-6616-43AB-A328-4EF7A6268847}" type="presOf" srcId="{4940A39E-1769-4461-A9C0-780344A73B93}" destId="{C9D58202-D48A-4CC2-8D50-2ABA2F8754E4}" srcOrd="1" destOrd="0" presId="urn:microsoft.com/office/officeart/2005/8/layout/radial5"/>
+    <dgm:cxn modelId="{A4216A27-CFDD-4894-85C5-5AC8402DC54F}" srcId="{2857681A-C08C-4ACC-B2D4-A4A8D80F63F6}" destId="{BA30CB08-C27E-4176-9DC6-44B8F3045D4D}" srcOrd="0" destOrd="0" parTransId="{4940A39E-1769-4461-A9C0-780344A73B93}" sibTransId="{6E690CE8-C301-484B-8E2C-E1A6D75EF4FD}"/>
+    <dgm:cxn modelId="{77AD715D-59B1-4975-8AED-084FBE71CC85}" srcId="{E4605E99-D788-40CC-B84F-B096F3844303}" destId="{2857681A-C08C-4ACC-B2D4-A4A8D80F63F6}" srcOrd="0" destOrd="0" parTransId="{B9C62753-A65D-4E2B-AB84-B6F4C89B580B}" sibTransId="{8D2BD304-860B-4BAD-8AAA-F2C65CC5421B}"/>
+    <dgm:cxn modelId="{671F2D2F-C21E-4765-AFE4-9999C5C6057D}" srcId="{2857681A-C08C-4ACC-B2D4-A4A8D80F63F6}" destId="{7900B2A5-9AE7-46AA-8868-DC204892F73A}" srcOrd="1" destOrd="0" parTransId="{BD6BC54F-ECB2-46DC-B744-FC1AA22E6916}" sibTransId="{5F66FFC1-D01C-4A5D-87B5-F0A4D3804D29}"/>
     <dgm:cxn modelId="{83031BE7-7724-4554-BC7A-F21517EDC060}" type="presOf" srcId="{19B2ED47-192C-43D0-B91B-04AD18257B1C}" destId="{C0F774C3-6911-451D-9EDA-A7E7C3E7C701}" srcOrd="0" destOrd="1" presId="urn:microsoft.com/office/officeart/2005/8/layout/radial5"/>
-    <dgm:cxn modelId="{BB1888FF-F6B6-4AED-850F-F4B4F328F4D5}" type="presOf" srcId="{72EBABCD-A694-46CD-A074-C9CFEAA3A3EB}" destId="{E3278750-3545-41D0-9098-49EF51C45F2A}" srcOrd="0" destOrd="0" presId="urn:microsoft.com/office/officeart/2005/8/layout/radial5"/>
-    <dgm:cxn modelId="{9E00953F-80C6-4E38-802D-4459082E920E}" srcId="{BA30CB08-C27E-4176-9DC6-44B8F3045D4D}" destId="{19B2ED47-192C-43D0-B91B-04AD18257B1C}" srcOrd="0" destOrd="0" parTransId="{0B0D8767-681D-4FC8-A9BD-09EE33A0AE94}" sibTransId="{DDE0FFDE-0BC5-434B-B1E4-FF31FB58390D}"/>
-    <dgm:cxn modelId="{21457BF2-7EE9-4E84-82F3-4EFC3880C900}" type="presOf" srcId="{D2F9420E-3E2E-46BD-A80B-29E2424D5A64}" destId="{C0F774C3-6911-451D-9EDA-A7E7C3E7C701}" srcOrd="0" destOrd="3" presId="urn:microsoft.com/office/officeart/2005/8/layout/radial5"/>
-    <dgm:cxn modelId="{9A6BCB13-6616-43AB-A328-4EF7A6268847}" type="presOf" srcId="{4940A39E-1769-4461-A9C0-780344A73B93}" destId="{C9D58202-D48A-4CC2-8D50-2ABA2F8754E4}" srcOrd="1" destOrd="0" presId="urn:microsoft.com/office/officeart/2005/8/layout/radial5"/>
+    <dgm:cxn modelId="{FEEDBDC6-C85B-48FF-9478-83FC0380E24A}" type="presOf" srcId="{BA30CB08-C27E-4176-9DC6-44B8F3045D4D}" destId="{C0F774C3-6911-451D-9EDA-A7E7C3E7C701}" srcOrd="0" destOrd="0" presId="urn:microsoft.com/office/officeart/2005/8/layout/radial5"/>
+    <dgm:cxn modelId="{3B106CB8-7F6A-4183-8B62-FA9DFE618B03}" type="presOf" srcId="{3EDF8D53-410C-4268-9472-D8776C4375CE}" destId="{C0F774C3-6911-451D-9EDA-A7E7C3E7C701}" srcOrd="0" destOrd="2" presId="urn:microsoft.com/office/officeart/2005/8/layout/radial5"/>
     <dgm:cxn modelId="{31A6ED57-4FAA-4EF6-B6FD-7FFBFBB0FD68}" type="presOf" srcId="{90669A4F-190D-4C73-AA80-0F54281701A1}" destId="{8BA65011-FACA-4C1E-969F-1849C9976FB2}" srcOrd="0" destOrd="0" presId="urn:microsoft.com/office/officeart/2005/8/layout/radial5"/>
-    <dgm:cxn modelId="{B546F47C-2BD0-4FC0-97B4-CD1BB28DCE4F}" type="presOf" srcId="{90669A4F-190D-4C73-AA80-0F54281701A1}" destId="{68EFFC91-B051-4BF3-90C6-4A4BD7F1D3CE}" srcOrd="1" destOrd="0" presId="urn:microsoft.com/office/officeart/2005/8/layout/radial5"/>
-    <dgm:cxn modelId="{0D80A71E-88DD-425D-AA4A-5847B61AF8D9}" type="presOf" srcId="{7900B2A5-9AE7-46AA-8868-DC204892F73A}" destId="{D1E67752-51AF-4472-AD44-35AEE8E1B9DB}" srcOrd="0" destOrd="0" presId="urn:microsoft.com/office/officeart/2005/8/layout/radial5"/>
-    <dgm:cxn modelId="{3CB3F05B-EFBC-4D18-AE21-715798D9F7B5}" srcId="{BA30CB08-C27E-4176-9DC6-44B8F3045D4D}" destId="{D2F9420E-3E2E-46BD-A80B-29E2424D5A64}" srcOrd="2" destOrd="0" parTransId="{C4BA4B62-A662-49BC-9D1A-58AAC77A135E}" sibTransId="{E4EF8C97-C403-48F9-BFB2-2556C8A82C47}"/>
-    <dgm:cxn modelId="{B266AE08-8E20-480C-B2F1-639B4B5CBE4F}" type="presOf" srcId="{E4605E99-D788-40CC-B84F-B096F3844303}" destId="{42CDD322-C3FE-40C7-A54E-55B560603AE9}" srcOrd="0" destOrd="0" presId="urn:microsoft.com/office/officeart/2005/8/layout/radial5"/>
-    <dgm:cxn modelId="{71B11EC1-3175-4C27-A1A4-DDFDDB810599}" srcId="{2857681A-C08C-4ACC-B2D4-A4A8D80F63F6}" destId="{B2F49888-A987-4C1F-8B6A-057D77BE65FA}" srcOrd="3" destOrd="0" parTransId="{90669A4F-190D-4C73-AA80-0F54281701A1}" sibTransId="{F4213411-7083-4B4C-A8CF-2D93D3FF83EB}"/>
-    <dgm:cxn modelId="{F122E652-67A7-4334-B34C-88BFA399D39B}" type="presOf" srcId="{72EBABCD-A694-46CD-A074-C9CFEAA3A3EB}" destId="{37686E1C-FB33-4701-9F70-50D3E1BF47BD}" srcOrd="1" destOrd="0" presId="urn:microsoft.com/office/officeart/2005/8/layout/radial5"/>
-    <dgm:cxn modelId="{A4216A27-CFDD-4894-85C5-5AC8402DC54F}" srcId="{2857681A-C08C-4ACC-B2D4-A4A8D80F63F6}" destId="{BA30CB08-C27E-4176-9DC6-44B8F3045D4D}" srcOrd="0" destOrd="0" parTransId="{4940A39E-1769-4461-A9C0-780344A73B93}" sibTransId="{6E690CE8-C301-484B-8E2C-E1A6D75EF4FD}"/>
-    <dgm:cxn modelId="{FEEDBDC6-C85B-48FF-9478-83FC0380E24A}" type="presOf" srcId="{BA30CB08-C27E-4176-9DC6-44B8F3045D4D}" destId="{C0F774C3-6911-451D-9EDA-A7E7C3E7C701}" srcOrd="0" destOrd="0" presId="urn:microsoft.com/office/officeart/2005/8/layout/radial5"/>
-    <dgm:cxn modelId="{E2BD91FC-9DE3-41E8-B828-DC5F37168DB8}" type="presOf" srcId="{BD6BC54F-ECB2-46DC-B744-FC1AA22E6916}" destId="{DD2937F4-E937-4C1A-AD1B-666B3DA7714F}" srcOrd="1" destOrd="0" presId="urn:microsoft.com/office/officeart/2005/8/layout/radial5"/>
-    <dgm:cxn modelId="{671F2D2F-C21E-4765-AFE4-9999C5C6057D}" srcId="{2857681A-C08C-4ACC-B2D4-A4A8D80F63F6}" destId="{7900B2A5-9AE7-46AA-8868-DC204892F73A}" srcOrd="1" destOrd="0" parTransId="{BD6BC54F-ECB2-46DC-B744-FC1AA22E6916}" sibTransId="{5F66FFC1-D01C-4A5D-87B5-F0A4D3804D29}"/>
-    <dgm:cxn modelId="{3B106CB8-7F6A-4183-8B62-FA9DFE618B03}" type="presOf" srcId="{3EDF8D53-410C-4268-9472-D8776C4375CE}" destId="{C0F774C3-6911-451D-9EDA-A7E7C3E7C701}" srcOrd="0" destOrd="2" presId="urn:microsoft.com/office/officeart/2005/8/layout/radial5"/>
-    <dgm:cxn modelId="{102ABBC3-959C-4A00-B593-2A88CC293F56}" srcId="{BA30CB08-C27E-4176-9DC6-44B8F3045D4D}" destId="{3EDF8D53-410C-4268-9472-D8776C4375CE}" srcOrd="1" destOrd="0" parTransId="{9845E75B-8E16-4BAB-8BFB-F85057241444}" sibTransId="{54593402-1004-41D8-9780-4493DE1FB46D}"/>
-    <dgm:cxn modelId="{462B633D-DFE9-4F69-BBB9-3D3832CC6D34}" type="presOf" srcId="{391CA999-2D3D-480F-8FFE-94985539FB61}" destId="{F4821AD9-0E74-4C87-BF54-53D7672E1C1E}" srcOrd="0" destOrd="0" presId="urn:microsoft.com/office/officeart/2005/8/layout/radial5"/>
-    <dgm:cxn modelId="{4CD10723-1398-4FB8-A48F-FDA3A5B38C56}" type="presOf" srcId="{BD6BC54F-ECB2-46DC-B744-FC1AA22E6916}" destId="{B93BD03F-25A2-4FB8-88CF-D81B31C593BB}" srcOrd="0" destOrd="0" presId="urn:microsoft.com/office/officeart/2005/8/layout/radial5"/>
-    <dgm:cxn modelId="{15F115E3-443F-4D4C-9A0D-F731F3C48025}" type="presOf" srcId="{4940A39E-1769-4461-A9C0-780344A73B93}" destId="{50083348-D83D-4625-BDCE-0B82C4D2C9D7}" srcOrd="0" destOrd="0" presId="urn:microsoft.com/office/officeart/2005/8/layout/radial5"/>
-    <dgm:cxn modelId="{77AD715D-59B1-4975-8AED-084FBE71CC85}" srcId="{E4605E99-D788-40CC-B84F-B096F3844303}" destId="{2857681A-C08C-4ACC-B2D4-A4A8D80F63F6}" srcOrd="0" destOrd="0" parTransId="{B9C62753-A65D-4E2B-AB84-B6F4C89B580B}" sibTransId="{8D2BD304-860B-4BAD-8AAA-F2C65CC5421B}"/>
-    <dgm:cxn modelId="{0A45F097-A2F1-43CA-89C2-C3C067BAEA37}" srcId="{2857681A-C08C-4ACC-B2D4-A4A8D80F63F6}" destId="{391CA999-2D3D-480F-8FFE-94985539FB61}" srcOrd="2" destOrd="0" parTransId="{72EBABCD-A694-46CD-A074-C9CFEAA3A3EB}" sibTransId="{2E7A4A67-3A0C-4AC0-9173-D9A7D240C226}"/>
-    <dgm:cxn modelId="{D0881804-0E72-417E-BF89-A43F45A0D91B}" type="presOf" srcId="{2857681A-C08C-4ACC-B2D4-A4A8D80F63F6}" destId="{9E6E3828-A769-4642-90F4-6CC29F79FE54}" srcOrd="0" destOrd="0" presId="urn:microsoft.com/office/officeart/2005/8/layout/radial5"/>
-    <dgm:cxn modelId="{6FDEA8F9-71EC-4A3D-89D8-5AB800226D75}" type="presOf" srcId="{B2F49888-A987-4C1F-8B6A-057D77BE65FA}" destId="{C4D1BB34-70D8-4EF8-BFC2-AA6246655B35}" srcOrd="0" destOrd="0" presId="urn:microsoft.com/office/officeart/2005/8/layout/radial5"/>
     <dgm:cxn modelId="{DAF3A2F7-2247-4028-BBDD-1C79686D02D0}" type="presParOf" srcId="{42CDD322-C3FE-40C7-A54E-55B560603AE9}" destId="{9E6E3828-A769-4642-90F4-6CC29F79FE54}" srcOrd="0" destOrd="0" presId="urn:microsoft.com/office/officeart/2005/8/layout/radial5"/>
     <dgm:cxn modelId="{086B3F36-0CF8-4712-ADD1-0C2EC586EF54}" type="presParOf" srcId="{42CDD322-C3FE-40C7-A54E-55B560603AE9}" destId="{50083348-D83D-4625-BDCE-0B82C4D2C9D7}" srcOrd="1" destOrd="0" presId="urn:microsoft.com/office/officeart/2005/8/layout/radial5"/>
     <dgm:cxn modelId="{CA2D6574-E43F-489D-B9E5-2CC185095820}" type="presParOf" srcId="{50083348-D83D-4625-BDCE-0B82C4D2C9D7}" destId="{C9D58202-D48A-4CC2-8D50-2ABA2F8754E4}" srcOrd="0" destOrd="0" presId="urn:microsoft.com/office/officeart/2005/8/layout/radial5"/>
@@ -1503,7 +1503,7 @@
   <dgm:whole/>
   <dgm:extLst>
     <a:ext uri="http://schemas.microsoft.com/office/drawing/2008/diagram">
-      <dsp:dataModelExt xmlns:dsp="http://schemas.microsoft.com/office/drawing/2008/diagram" relId="rId6" minVer="http://schemas.openxmlformats.org/drawingml/2006/diagram"/>
+      <dsp:dataModelExt xmlns:dsp="http://schemas.microsoft.com/office/drawing/2008/diagram" relId="rId7" minVer="http://schemas.openxmlformats.org/drawingml/2006/diagram"/>
     </a:ext>
   </dgm:extLst>
 </dgm:dataModel>
@@ -4144,7 +4144,7 @@
           <a:p>
             <a:fld id="{3C82C259-0100-4357-933D-27583B746048}" type="datetime1">
               <a:rPr lang="pt-PT" smtClean="0"/>
-              <a:t>23-03-2015</a:t>
+              <a:t>23/03/2015</a:t>
             </a:fld>
             <a:endParaRPr/>
           </a:p>
@@ -4310,7 +4310,7 @@
           <a:p>
             <a:fld id="{4CEE548C-493F-4FD1-9ECB-917AA81544ED}" type="datetime1">
               <a:rPr lang="pt-PT" smtClean="0"/>
-              <a:t>23-03-2015</a:t>
+              <a:t>23/03/2015</a:t>
             </a:fld>
             <a:endParaRPr/>
           </a:p>
@@ -4622,7 +4622,23 @@
           <a:bodyPr/>
           <a:lstStyle/>
           <a:p>
-            <a:endParaRPr lang="pt-PT"/>
+            <a:r>
+              <a:rPr lang="pt-PT" dirty="0" smtClean="0"/>
+              <a:t>Olá</a:t>
+            </a:r>
+            <a:r>
+              <a:rPr lang="pt-PT" baseline="0" dirty="0" smtClean="0"/>
+              <a:t> boa tarde! Sou o ___ e estou aqui para apresentar o nosso projeto de Laboratórios de Informática IV que se chama “Aprende com os </a:t>
+            </a:r>
+            <a:r>
+              <a:rPr lang="pt-PT" baseline="0" dirty="0" err="1" smtClean="0"/>
+              <a:t>Minions</a:t>
+            </a:r>
+            <a:r>
+              <a:rPr lang="pt-PT" baseline="0" dirty="0" smtClean="0"/>
+              <a:t>”.</a:t>
+            </a:r>
+            <a:endParaRPr lang="pt-PT" dirty="0"/>
           </a:p>
         </p:txBody>
       </p:sp>
@@ -4666,7 +4682,7 @@
           <a:p>
             <a:fld id="{AD07E7F5-D94A-4B9A-9916-8485E0C2D024}" type="datetime1">
               <a:rPr lang="pt-PT" smtClean="0"/>
-              <a:t>23-03-2015</a:t>
+              <a:t>23/03/2015</a:t>
             </a:fld>
             <a:endParaRPr lang="pt-PT"/>
           </a:p>
@@ -4676,6 +4692,113 @@
     <p:extLst>
       <p:ext uri="{BB962C8B-B14F-4D97-AF65-F5344CB8AC3E}">
         <p14:creationId xmlns:p14="http://schemas.microsoft.com/office/powerpoint/2010/main" val="2039900519"/>
+      </p:ext>
+    </p:extLst>
+  </p:cSld>
+  <p:clrMapOvr>
+    <a:masterClrMapping/>
+  </p:clrMapOvr>
+</p:notes>
+</file>
+
+<file path=ppt/notesSlides/notesSlide10.xml><?xml version="1.0" encoding="utf-8"?>
+<p:notes xmlns:a="http://schemas.openxmlformats.org/drawingml/2006/main" xmlns:r="http://schemas.openxmlformats.org/officeDocument/2006/relationships" xmlns:p="http://schemas.openxmlformats.org/presentationml/2006/main">
+  <p:cSld>
+    <p:spTree>
+      <p:nvGrpSpPr>
+        <p:cNvPr id="1" name=""/>
+        <p:cNvGrpSpPr/>
+        <p:nvPr/>
+      </p:nvGrpSpPr>
+      <p:grpSpPr>
+        <a:xfrm>
+          <a:off x="0" y="0"/>
+          <a:ext cx="0" cy="0"/>
+          <a:chOff x="0" y="0"/>
+          <a:chExt cx="0" cy="0"/>
+        </a:xfrm>
+      </p:grpSpPr>
+      <p:sp>
+        <p:nvSpPr>
+          <p:cNvPr id="2" name="Marcador de Posição da Imagem do Diapositivo 1"/>
+          <p:cNvSpPr>
+            <a:spLocks noGrp="1" noRot="1" noChangeAspect="1"/>
+          </p:cNvSpPr>
+          <p:nvPr>
+            <p:ph type="sldImg"/>
+          </p:nvPr>
+        </p:nvSpPr>
+        <p:spPr/>
+      </p:sp>
+      <p:sp>
+        <p:nvSpPr>
+          <p:cNvPr id="3" name="Marcador de Posição de Notas 2"/>
+          <p:cNvSpPr>
+            <a:spLocks noGrp="1"/>
+          </p:cNvSpPr>
+          <p:nvPr>
+            <p:ph type="body" idx="1"/>
+          </p:nvPr>
+        </p:nvSpPr>
+        <p:spPr/>
+        <p:txBody>
+          <a:bodyPr/>
+          <a:lstStyle/>
+          <a:p>
+            <a:endParaRPr lang="pt-PT" dirty="0"/>
+          </a:p>
+        </p:txBody>
+      </p:sp>
+      <p:sp>
+        <p:nvSpPr>
+          <p:cNvPr id="4" name="Marcador de Posição do Número do Diapositivo 3"/>
+          <p:cNvSpPr>
+            <a:spLocks noGrp="1"/>
+          </p:cNvSpPr>
+          <p:nvPr>
+            <p:ph type="sldNum" sz="quarter" idx="10"/>
+          </p:nvPr>
+        </p:nvSpPr>
+        <p:spPr/>
+        <p:txBody>
+          <a:bodyPr/>
+          <a:lstStyle/>
+          <a:p>
+            <a:fld id="{01F2A70B-78F2-4DCF-B53B-C990D2FAFB8A}" type="slidenum">
+              <a:rPr lang="pt-PT" smtClean="0"/>
+              <a:t>10</a:t>
+            </a:fld>
+            <a:endParaRPr lang="pt-PT"/>
+          </a:p>
+        </p:txBody>
+      </p:sp>
+      <p:sp>
+        <p:nvSpPr>
+          <p:cNvPr id="5" name="Marcador de Posição da Data 4"/>
+          <p:cNvSpPr>
+            <a:spLocks noGrp="1"/>
+          </p:cNvSpPr>
+          <p:nvPr>
+            <p:ph type="dt" idx="11"/>
+          </p:nvPr>
+        </p:nvSpPr>
+        <p:spPr/>
+        <p:txBody>
+          <a:bodyPr/>
+          <a:lstStyle/>
+          <a:p>
+            <a:fld id="{AD07E7F5-D94A-4B9A-9916-8485E0C2D024}" type="datetime1">
+              <a:rPr lang="pt-PT" smtClean="0"/>
+              <a:t>23/03/2015</a:t>
+            </a:fld>
+            <a:endParaRPr lang="pt-PT"/>
+          </a:p>
+        </p:txBody>
+      </p:sp>
+    </p:spTree>
+    <p:extLst>
+      <p:ext uri="{BB962C8B-B14F-4D97-AF65-F5344CB8AC3E}">
+        <p14:creationId xmlns:p14="http://schemas.microsoft.com/office/powerpoint/2010/main" val="763271940"/>
       </p:ext>
     </p:extLst>
   </p:cSld>
@@ -4729,7 +4852,38 @@
           <a:bodyPr/>
           <a:lstStyle/>
           <a:p>
-            <a:endParaRPr lang="pt-PT"/>
+            <a:pPr marL="0" marR="0" indent="0" algn="l" defTabSz="914400" rtl="0" eaLnBrk="1" fontAlgn="auto" latinLnBrk="0" hangingPunct="1">
+              <a:lnSpc>
+                <a:spcPct val="100000"/>
+              </a:lnSpc>
+              <a:spcBef>
+                <a:spcPts val="0"/>
+              </a:spcBef>
+              <a:spcAft>
+                <a:spcPts val="0"/>
+              </a:spcAft>
+              <a:buClrTx/>
+              <a:buSzTx/>
+              <a:buFontTx/>
+              <a:buNone/>
+              <a:tabLst/>
+              <a:defRPr/>
+            </a:pPr>
+            <a:r>
+              <a:rPr lang="pt-PT" sz="1200" kern="1200" dirty="0" smtClean="0">
+                <a:solidFill>
+                  <a:schemeClr val="tx1"/>
+                </a:solidFill>
+                <a:effectLst/>
+                <a:latin typeface="+mn-lt"/>
+                <a:ea typeface="+mn-ea"/>
+                <a:cs typeface="+mn-cs"/>
+              </a:rPr>
+              <a:t>O projeto proposto trata-se de um Assistente Pedagógico com o objetivo de auxiliar crianças entre os 8 e os 9 anos de idade (que frequentem o 3º ano de escolaridade) na aprendizagem de um dos tópicos abordados no seu plano de estudos: as figuras geométricas. </a:t>
+            </a:r>
+          </a:p>
+          <a:p>
+            <a:endParaRPr lang="pt-PT" dirty="0"/>
           </a:p>
         </p:txBody>
       </p:sp>
@@ -4773,7 +4927,7 @@
           <a:p>
             <a:fld id="{47C351CA-D947-4DE9-B94F-31EF78C02738}" type="datetime1">
               <a:rPr lang="pt-PT" smtClean="0"/>
-              <a:t>23-03-2015</a:t>
+              <a:t>23/03/2015</a:t>
             </a:fld>
             <a:endParaRPr lang="pt-PT"/>
           </a:p>
@@ -4836,18 +4990,64 @@
           <a:bodyPr/>
           <a:lstStyle/>
           <a:p>
-            <a:endParaRPr lang="pt-PT"/>
+            <a:r>
+              <a:rPr lang="pt-PT" dirty="0" smtClean="0"/>
+              <a:t>A nossa apresentação vai focar-se</a:t>
+            </a:r>
+            <a:r>
+              <a:rPr lang="pt-PT" baseline="0" dirty="0" smtClean="0"/>
+              <a:t> nos seguintes pontos…</a:t>
+            </a:r>
+          </a:p>
+          <a:p>
+            <a:r>
+              <a:rPr lang="pt-PT" baseline="0" dirty="0" smtClean="0"/>
+              <a:t>Começamos com a contextualização do problema…</a:t>
+            </a:r>
+          </a:p>
+          <a:p>
+            <a:r>
+              <a:rPr lang="pt-PT" baseline="0" dirty="0" smtClean="0"/>
+              <a:t>Segue-se a…</a:t>
+            </a:r>
+          </a:p>
+          <a:p>
+            <a:r>
+              <a:rPr lang="pt-PT" baseline="0" dirty="0" smtClean="0"/>
+              <a:t>Depois temos a…</a:t>
+            </a:r>
+          </a:p>
+          <a:p>
+            <a:r>
+              <a:rPr lang="pt-PT" baseline="0" dirty="0" smtClean="0"/>
+              <a:t>De seguida temos a…</a:t>
+            </a:r>
+          </a:p>
+          <a:p>
+            <a:r>
+              <a:rPr lang="pt-PT" baseline="0" dirty="0" smtClean="0"/>
+              <a:t>(…)</a:t>
+            </a:r>
+          </a:p>
+          <a:p>
+            <a:r>
+              <a:rPr lang="pt-PT" baseline="0" dirty="0" smtClean="0"/>
+              <a:t>E por último temos a…</a:t>
+            </a:r>
+          </a:p>
+          <a:p>
+            <a:endParaRPr lang="pt-PT" dirty="0"/>
           </a:p>
         </p:txBody>
       </p:sp>
       <p:sp>
         <p:nvSpPr>
-          <p:cNvPr id="4" name="Marcador de Posição do Número do Diapositivo 3"/>
+          <p:cNvPr id="4" name="Marcador de Posição da Data 3"/>
           <p:cNvSpPr>
             <a:spLocks noGrp="1"/>
           </p:cNvSpPr>
           <p:nvPr>
-            <p:ph type="sldNum" sz="quarter" idx="10"/>
+            <p:ph type="dt" idx="10"/>
           </p:nvPr>
         </p:nvSpPr>
         <p:spPr/>
@@ -4855,9 +5055,9 @@
           <a:bodyPr/>
           <a:lstStyle/>
           <a:p>
-            <a:fld id="{01F2A70B-78F2-4DCF-B53B-C990D2FAFB8A}" type="slidenum">
+            <a:fld id="{4CEE548C-493F-4FD1-9ECB-917AA81544ED}" type="datetime1">
               <a:rPr lang="pt-PT" smtClean="0"/>
-              <a:t>10</a:t>
+              <a:t>23/03/2015</a:t>
             </a:fld>
             <a:endParaRPr lang="pt-PT"/>
           </a:p>
@@ -4865,12 +5065,12 @@
       </p:sp>
       <p:sp>
         <p:nvSpPr>
-          <p:cNvPr id="5" name="Marcador de Posição da Data 4"/>
+          <p:cNvPr id="5" name="Marcador de Posição do Número do Diapositivo 4"/>
           <p:cNvSpPr>
             <a:spLocks noGrp="1"/>
           </p:cNvSpPr>
           <p:nvPr>
-            <p:ph type="dt" idx="11"/>
+            <p:ph type="sldNum" sz="quarter" idx="11"/>
           </p:nvPr>
         </p:nvSpPr>
         <p:spPr/>
@@ -4878,9 +5078,9 @@
           <a:bodyPr/>
           <a:lstStyle/>
           <a:p>
-            <a:fld id="{AD07E7F5-D94A-4B9A-9916-8485E0C2D024}" type="datetime1">
+            <a:fld id="{01F2A70B-78F2-4DCF-B53B-C990D2FAFB8A}" type="slidenum">
               <a:rPr lang="pt-PT" smtClean="0"/>
-              <a:t>23-03-2015</a:t>
+              <a:t>3</a:t>
             </a:fld>
             <a:endParaRPr lang="pt-PT"/>
           </a:p>
@@ -4889,7 +5089,1271 @@
     </p:spTree>
     <p:extLst>
       <p:ext uri="{BB962C8B-B14F-4D97-AF65-F5344CB8AC3E}">
-        <p14:creationId xmlns:p14="http://schemas.microsoft.com/office/powerpoint/2010/main" val="763271940"/>
+        <p14:creationId xmlns:p14="http://schemas.microsoft.com/office/powerpoint/2010/main" val="1703286910"/>
+      </p:ext>
+    </p:extLst>
+  </p:cSld>
+  <p:clrMapOvr>
+    <a:masterClrMapping/>
+  </p:clrMapOvr>
+</p:notes>
+</file>
+
+<file path=ppt/notesSlides/notesSlide4.xml><?xml version="1.0" encoding="utf-8"?>
+<p:notes xmlns:a="http://schemas.openxmlformats.org/drawingml/2006/main" xmlns:r="http://schemas.openxmlformats.org/officeDocument/2006/relationships" xmlns:p="http://schemas.openxmlformats.org/presentationml/2006/main">
+  <p:cSld>
+    <p:spTree>
+      <p:nvGrpSpPr>
+        <p:cNvPr id="1" name=""/>
+        <p:cNvGrpSpPr/>
+        <p:nvPr/>
+      </p:nvGrpSpPr>
+      <p:grpSpPr>
+        <a:xfrm>
+          <a:off x="0" y="0"/>
+          <a:ext cx="0" cy="0"/>
+          <a:chOff x="0" y="0"/>
+          <a:chExt cx="0" cy="0"/>
+        </a:xfrm>
+      </p:grpSpPr>
+      <p:sp>
+        <p:nvSpPr>
+          <p:cNvPr id="2" name="Marcador de Posição da Imagem do Diapositivo 1"/>
+          <p:cNvSpPr>
+            <a:spLocks noGrp="1" noRot="1" noChangeAspect="1"/>
+          </p:cNvSpPr>
+          <p:nvPr>
+            <p:ph type="sldImg"/>
+          </p:nvPr>
+        </p:nvSpPr>
+        <p:spPr/>
+      </p:sp>
+      <p:sp>
+        <p:nvSpPr>
+          <p:cNvPr id="3" name="Marcador de Posição de Notas 2"/>
+          <p:cNvSpPr>
+            <a:spLocks noGrp="1"/>
+          </p:cNvSpPr>
+          <p:nvPr>
+            <p:ph type="body" idx="1"/>
+          </p:nvPr>
+        </p:nvSpPr>
+        <p:spPr/>
+        <p:txBody>
+          <a:bodyPr/>
+          <a:lstStyle/>
+          <a:p>
+            <a:r>
+              <a:rPr lang="pt-PT" sz="1200" kern="1200" dirty="0" smtClean="0">
+                <a:solidFill>
+                  <a:schemeClr val="tx1"/>
+                </a:solidFill>
+                <a:effectLst/>
+                <a:latin typeface="+mn-lt"/>
+                <a:ea typeface="+mn-ea"/>
+                <a:cs typeface="+mn-cs"/>
+              </a:rPr>
+              <a:t>DIFICULDADE apresentada aos alunos do ENSINO</a:t>
+            </a:r>
+            <a:r>
+              <a:rPr lang="pt-PT" sz="1200" kern="1200" baseline="0" dirty="0" smtClean="0">
+                <a:solidFill>
+                  <a:schemeClr val="tx1"/>
+                </a:solidFill>
+                <a:effectLst/>
+                <a:latin typeface="+mn-lt"/>
+                <a:ea typeface="+mn-ea"/>
+                <a:cs typeface="+mn-cs"/>
+              </a:rPr>
+              <a:t> BÁSICO,</a:t>
+            </a:r>
+            <a:r>
+              <a:rPr lang="pt-PT" sz="1200" kern="1200" dirty="0" smtClean="0">
+                <a:solidFill>
+                  <a:schemeClr val="tx1"/>
+                </a:solidFill>
+                <a:effectLst/>
+                <a:latin typeface="+mn-lt"/>
+                <a:ea typeface="+mn-ea"/>
+                <a:cs typeface="+mn-cs"/>
+              </a:rPr>
+              <a:t> principalmente na área da MATEMÁTICA.</a:t>
+            </a:r>
+          </a:p>
+          <a:p>
+            <a:endParaRPr lang="pt-PT" sz="1200" kern="1200" dirty="0" smtClean="0">
+              <a:solidFill>
+                <a:schemeClr val="tx1"/>
+              </a:solidFill>
+              <a:effectLst/>
+              <a:latin typeface="+mn-lt"/>
+              <a:ea typeface="+mn-ea"/>
+              <a:cs typeface="+mn-cs"/>
+            </a:endParaRPr>
+          </a:p>
+          <a:p>
+            <a:r>
+              <a:rPr lang="pt-PT" sz="1200" kern="1200" dirty="0" smtClean="0">
+                <a:solidFill>
+                  <a:schemeClr val="tx1"/>
+                </a:solidFill>
+                <a:effectLst/>
+                <a:latin typeface="+mn-lt"/>
+                <a:ea typeface="+mn-ea"/>
+                <a:cs typeface="+mn-cs"/>
+              </a:rPr>
+              <a:t>Um APOIO EXTRA ao trabalho realizado puma FORMA DE ESTUDO APELATIVA de modo a estimular uma FÁCIL APRENDIZAGEM das matérias lecionadas.</a:t>
+            </a:r>
+          </a:p>
+          <a:p>
+            <a:endParaRPr lang="pt-PT" dirty="0"/>
+          </a:p>
+        </p:txBody>
+      </p:sp>
+      <p:sp>
+        <p:nvSpPr>
+          <p:cNvPr id="4" name="Marcador de Posição da Data 3"/>
+          <p:cNvSpPr>
+            <a:spLocks noGrp="1"/>
+          </p:cNvSpPr>
+          <p:nvPr>
+            <p:ph type="dt" idx="10"/>
+          </p:nvPr>
+        </p:nvSpPr>
+        <p:spPr/>
+        <p:txBody>
+          <a:bodyPr/>
+          <a:lstStyle/>
+          <a:p>
+            <a:fld id="{4CEE548C-493F-4FD1-9ECB-917AA81544ED}" type="datetime1">
+              <a:rPr lang="pt-PT" smtClean="0"/>
+              <a:t>23/03/2015</a:t>
+            </a:fld>
+            <a:endParaRPr lang="pt-PT"/>
+          </a:p>
+        </p:txBody>
+      </p:sp>
+      <p:sp>
+        <p:nvSpPr>
+          <p:cNvPr id="5" name="Marcador de Posição do Número do Diapositivo 4"/>
+          <p:cNvSpPr>
+            <a:spLocks noGrp="1"/>
+          </p:cNvSpPr>
+          <p:nvPr>
+            <p:ph type="sldNum" sz="quarter" idx="11"/>
+          </p:nvPr>
+        </p:nvSpPr>
+        <p:spPr/>
+        <p:txBody>
+          <a:bodyPr/>
+          <a:lstStyle/>
+          <a:p>
+            <a:fld id="{01F2A70B-78F2-4DCF-B53B-C990D2FAFB8A}" type="slidenum">
+              <a:rPr lang="pt-PT" smtClean="0"/>
+              <a:t>4</a:t>
+            </a:fld>
+            <a:endParaRPr lang="pt-PT"/>
+          </a:p>
+        </p:txBody>
+      </p:sp>
+    </p:spTree>
+    <p:extLst>
+      <p:ext uri="{BB962C8B-B14F-4D97-AF65-F5344CB8AC3E}">
+        <p14:creationId xmlns:p14="http://schemas.microsoft.com/office/powerpoint/2010/main" val="3648628845"/>
+      </p:ext>
+    </p:extLst>
+  </p:cSld>
+  <p:clrMapOvr>
+    <a:masterClrMapping/>
+  </p:clrMapOvr>
+</p:notes>
+</file>
+
+<file path=ppt/notesSlides/notesSlide5.xml><?xml version="1.0" encoding="utf-8"?>
+<p:notes xmlns:a="http://schemas.openxmlformats.org/drawingml/2006/main" xmlns:r="http://schemas.openxmlformats.org/officeDocument/2006/relationships" xmlns:p="http://schemas.openxmlformats.org/presentationml/2006/main">
+  <p:cSld>
+    <p:spTree>
+      <p:nvGrpSpPr>
+        <p:cNvPr id="1" name=""/>
+        <p:cNvGrpSpPr/>
+        <p:nvPr/>
+      </p:nvGrpSpPr>
+      <p:grpSpPr>
+        <a:xfrm>
+          <a:off x="0" y="0"/>
+          <a:ext cx="0" cy="0"/>
+          <a:chOff x="0" y="0"/>
+          <a:chExt cx="0" cy="0"/>
+        </a:xfrm>
+      </p:grpSpPr>
+      <p:sp>
+        <p:nvSpPr>
+          <p:cNvPr id="2" name="Marcador de Posição da Imagem do Diapositivo 1"/>
+          <p:cNvSpPr>
+            <a:spLocks noGrp="1" noRot="1" noChangeAspect="1"/>
+          </p:cNvSpPr>
+          <p:nvPr>
+            <p:ph type="sldImg"/>
+          </p:nvPr>
+        </p:nvSpPr>
+        <p:spPr/>
+      </p:sp>
+      <p:sp>
+        <p:nvSpPr>
+          <p:cNvPr id="3" name="Marcador de Posição de Notas 2"/>
+          <p:cNvSpPr>
+            <a:spLocks noGrp="1"/>
+          </p:cNvSpPr>
+          <p:nvPr>
+            <p:ph type="body" idx="1"/>
+          </p:nvPr>
+        </p:nvSpPr>
+        <p:spPr/>
+        <p:txBody>
+          <a:bodyPr/>
+          <a:lstStyle/>
+          <a:p>
+            <a:pPr marL="0" marR="0" indent="0" algn="l" defTabSz="914400" rtl="0" eaLnBrk="1" fontAlgn="auto" latinLnBrk="0" hangingPunct="1">
+              <a:lnSpc>
+                <a:spcPct val="100000"/>
+              </a:lnSpc>
+              <a:spcBef>
+                <a:spcPts val="0"/>
+              </a:spcBef>
+              <a:spcAft>
+                <a:spcPts val="0"/>
+              </a:spcAft>
+              <a:buClrTx/>
+              <a:buSzTx/>
+              <a:buFontTx/>
+              <a:buNone/>
+              <a:tabLst/>
+              <a:defRPr/>
+            </a:pPr>
+            <a:r>
+              <a:rPr lang="pt-PT" sz="1200" kern="1200" dirty="0" smtClean="0">
+                <a:solidFill>
+                  <a:schemeClr val="tx1"/>
+                </a:solidFill>
+                <a:effectLst/>
+                <a:latin typeface="+mn-lt"/>
+                <a:ea typeface="+mn-ea"/>
+                <a:cs typeface="+mn-cs"/>
+              </a:rPr>
+              <a:t>Os RESULTADOS dos alunos portugueses na disciplina de MATEMÁTICA têm sido PREOCUPANTES.</a:t>
+            </a:r>
+            <a:endParaRPr lang="pt-PT" dirty="0" smtClean="0"/>
+          </a:p>
+          <a:p>
+            <a:endParaRPr lang="pt-PT" sz="1200" kern="1200" dirty="0" smtClean="0">
+              <a:solidFill>
+                <a:schemeClr val="tx1"/>
+              </a:solidFill>
+              <a:effectLst/>
+              <a:latin typeface="+mn-lt"/>
+              <a:ea typeface="+mn-ea"/>
+              <a:cs typeface="+mn-cs"/>
+            </a:endParaRPr>
+          </a:p>
+          <a:p>
+            <a:pPr marL="0" marR="0" indent="0" algn="l" defTabSz="914400" rtl="0" eaLnBrk="1" fontAlgn="auto" latinLnBrk="0" hangingPunct="1">
+              <a:lnSpc>
+                <a:spcPct val="100000"/>
+              </a:lnSpc>
+              <a:spcBef>
+                <a:spcPts val="0"/>
+              </a:spcBef>
+              <a:spcAft>
+                <a:spcPts val="0"/>
+              </a:spcAft>
+              <a:buClrTx/>
+              <a:buSzTx/>
+              <a:buFontTx/>
+              <a:buNone/>
+              <a:tabLst/>
+              <a:defRPr/>
+            </a:pPr>
+            <a:r>
+              <a:rPr lang="pt-PT" sz="1200" kern="1200" dirty="0" smtClean="0">
+                <a:solidFill>
+                  <a:schemeClr val="tx1"/>
+                </a:solidFill>
+                <a:effectLst/>
+                <a:latin typeface="+mn-lt"/>
+                <a:ea typeface="+mn-ea"/>
+                <a:cs typeface="+mn-cs"/>
+              </a:rPr>
+              <a:t>Tal se deve ao facto de os TEMAS lecionados serem de uma MAIOR COMPLEXIDADE comparativamente aos temas lecionados nos anos letivos anteriores. </a:t>
+            </a:r>
+          </a:p>
+        </p:txBody>
+      </p:sp>
+      <p:sp>
+        <p:nvSpPr>
+          <p:cNvPr id="4" name="Marcador de Posição da Data 3"/>
+          <p:cNvSpPr>
+            <a:spLocks noGrp="1"/>
+          </p:cNvSpPr>
+          <p:nvPr>
+            <p:ph type="dt" idx="10"/>
+          </p:nvPr>
+        </p:nvSpPr>
+        <p:spPr/>
+        <p:txBody>
+          <a:bodyPr/>
+          <a:lstStyle/>
+          <a:p>
+            <a:fld id="{4CEE548C-493F-4FD1-9ECB-917AA81544ED}" type="datetime1">
+              <a:rPr lang="pt-PT" smtClean="0"/>
+              <a:t>23/03/2015</a:t>
+            </a:fld>
+            <a:endParaRPr lang="pt-PT"/>
+          </a:p>
+        </p:txBody>
+      </p:sp>
+      <p:sp>
+        <p:nvSpPr>
+          <p:cNvPr id="5" name="Marcador de Posição do Número do Diapositivo 4"/>
+          <p:cNvSpPr>
+            <a:spLocks noGrp="1"/>
+          </p:cNvSpPr>
+          <p:nvPr>
+            <p:ph type="sldNum" sz="quarter" idx="11"/>
+          </p:nvPr>
+        </p:nvSpPr>
+        <p:spPr/>
+        <p:txBody>
+          <a:bodyPr/>
+          <a:lstStyle/>
+          <a:p>
+            <a:fld id="{01F2A70B-78F2-4DCF-B53B-C990D2FAFB8A}" type="slidenum">
+              <a:rPr lang="pt-PT" smtClean="0"/>
+              <a:t>5</a:t>
+            </a:fld>
+            <a:endParaRPr lang="pt-PT"/>
+          </a:p>
+        </p:txBody>
+      </p:sp>
+    </p:spTree>
+    <p:extLst>
+      <p:ext uri="{BB962C8B-B14F-4D97-AF65-F5344CB8AC3E}">
+        <p14:creationId xmlns:p14="http://schemas.microsoft.com/office/powerpoint/2010/main" val="1482191662"/>
+      </p:ext>
+    </p:extLst>
+  </p:cSld>
+  <p:clrMapOvr>
+    <a:masterClrMapping/>
+  </p:clrMapOvr>
+</p:notes>
+</file>
+
+<file path=ppt/notesSlides/notesSlide6.xml><?xml version="1.0" encoding="utf-8"?>
+<p:notes xmlns:a="http://schemas.openxmlformats.org/drawingml/2006/main" xmlns:r="http://schemas.openxmlformats.org/officeDocument/2006/relationships" xmlns:p="http://schemas.openxmlformats.org/presentationml/2006/main">
+  <p:cSld>
+    <p:spTree>
+      <p:nvGrpSpPr>
+        <p:cNvPr id="1" name=""/>
+        <p:cNvGrpSpPr/>
+        <p:nvPr/>
+      </p:nvGrpSpPr>
+      <p:grpSpPr>
+        <a:xfrm>
+          <a:off x="0" y="0"/>
+          <a:ext cx="0" cy="0"/>
+          <a:chOff x="0" y="0"/>
+          <a:chExt cx="0" cy="0"/>
+        </a:xfrm>
+      </p:grpSpPr>
+      <p:sp>
+        <p:nvSpPr>
+          <p:cNvPr id="2" name="Marcador de Posição da Imagem do Diapositivo 1"/>
+          <p:cNvSpPr>
+            <a:spLocks noGrp="1" noRot="1" noChangeAspect="1"/>
+          </p:cNvSpPr>
+          <p:nvPr>
+            <p:ph type="sldImg"/>
+          </p:nvPr>
+        </p:nvSpPr>
+        <p:spPr/>
+      </p:sp>
+      <p:sp>
+        <p:nvSpPr>
+          <p:cNvPr id="3" name="Marcador de Posição de Notas 2"/>
+          <p:cNvSpPr>
+            <a:spLocks noGrp="1"/>
+          </p:cNvSpPr>
+          <p:nvPr>
+            <p:ph type="body" idx="1"/>
+          </p:nvPr>
+        </p:nvSpPr>
+        <p:spPr/>
+        <p:txBody>
+          <a:bodyPr/>
+          <a:lstStyle/>
+          <a:p>
+            <a:r>
+              <a:rPr lang="pt-PT" sz="1200" kern="1200" dirty="0" smtClean="0">
+                <a:solidFill>
+                  <a:schemeClr val="tx1"/>
+                </a:solidFill>
+                <a:effectLst/>
+                <a:latin typeface="+mn-lt"/>
+                <a:ea typeface="+mn-ea"/>
+                <a:cs typeface="+mn-cs"/>
+              </a:rPr>
+              <a:t>PAIS sem a DISPONIBILIDADE ou CAPACIDADE para AUXILIAR os mais pequenos a fazer os TRABALHOS de casa ou a ESTUDAR.</a:t>
+            </a:r>
+          </a:p>
+          <a:p>
+            <a:r>
+              <a:rPr lang="pt-PT" sz="1200" kern="1200" dirty="0" smtClean="0">
+                <a:solidFill>
+                  <a:schemeClr val="tx1"/>
+                </a:solidFill>
+                <a:effectLst/>
+                <a:latin typeface="+mn-lt"/>
+                <a:ea typeface="+mn-ea"/>
+                <a:cs typeface="+mn-cs"/>
+              </a:rPr>
+              <a:t>Os alunos sentem DIFICULDADES já no 1º ciclo do Ensino Básico </a:t>
+            </a:r>
+          </a:p>
+          <a:p>
+            <a:r>
+              <a:rPr lang="pt-PT" sz="1200" kern="1200" dirty="0" smtClean="0">
+                <a:solidFill>
+                  <a:schemeClr val="tx1"/>
+                </a:solidFill>
+                <a:effectLst/>
+                <a:latin typeface="+mn-lt"/>
+                <a:ea typeface="+mn-ea"/>
+                <a:cs typeface="+mn-cs"/>
+              </a:rPr>
+              <a:t>Tentativa de AJUDAR a RESOLVER este PROBLEMA</a:t>
+            </a:r>
+          </a:p>
+          <a:p>
+            <a:r>
+              <a:rPr lang="pt-PT" sz="1200" kern="1200" dirty="0" smtClean="0">
+                <a:solidFill>
+                  <a:schemeClr val="tx1"/>
+                </a:solidFill>
+                <a:effectLst/>
+                <a:latin typeface="+mn-lt"/>
+                <a:ea typeface="+mn-ea"/>
+                <a:cs typeface="+mn-cs"/>
+              </a:rPr>
+              <a:t>Métodos de ESTUDO mais ATRATIVOS</a:t>
+            </a:r>
+            <a:r>
+              <a:rPr lang="pt-PT" sz="1200" kern="1200" baseline="0" dirty="0" smtClean="0">
+                <a:solidFill>
+                  <a:schemeClr val="tx1"/>
+                </a:solidFill>
+                <a:effectLst/>
+                <a:latin typeface="+mn-lt"/>
+                <a:ea typeface="+mn-ea"/>
+                <a:cs typeface="+mn-cs"/>
+              </a:rPr>
+              <a:t> </a:t>
+            </a:r>
+            <a:r>
+              <a:rPr lang="pt-PT" sz="1200" kern="1200" dirty="0" smtClean="0">
+                <a:solidFill>
+                  <a:schemeClr val="tx1"/>
+                </a:solidFill>
+                <a:effectLst/>
+                <a:latin typeface="+mn-lt"/>
+                <a:ea typeface="+mn-ea"/>
+                <a:cs typeface="+mn-cs"/>
+              </a:rPr>
+              <a:t>e EFICAZES</a:t>
+            </a:r>
+            <a:r>
+              <a:rPr lang="pt-PT" sz="1200" kern="1200" baseline="0" dirty="0" smtClean="0">
+                <a:solidFill>
+                  <a:schemeClr val="tx1"/>
+                </a:solidFill>
+                <a:effectLst/>
+                <a:latin typeface="+mn-lt"/>
+                <a:ea typeface="+mn-ea"/>
+                <a:cs typeface="+mn-cs"/>
+              </a:rPr>
+              <a:t> </a:t>
+            </a:r>
+            <a:r>
+              <a:rPr lang="pt-PT" sz="1200" kern="1200" dirty="0" smtClean="0">
+                <a:solidFill>
+                  <a:schemeClr val="tx1"/>
+                </a:solidFill>
+                <a:effectLst/>
+                <a:latin typeface="+mn-lt"/>
+                <a:ea typeface="+mn-ea"/>
+                <a:cs typeface="+mn-cs"/>
+              </a:rPr>
+              <a:t>por forma a CONDUZIR a um MAIOR</a:t>
+            </a:r>
+            <a:r>
+              <a:rPr lang="pt-PT" sz="1200" kern="1200" baseline="0" dirty="0" smtClean="0">
+                <a:solidFill>
+                  <a:schemeClr val="tx1"/>
+                </a:solidFill>
+                <a:effectLst/>
+                <a:latin typeface="+mn-lt"/>
+                <a:ea typeface="+mn-ea"/>
+                <a:cs typeface="+mn-cs"/>
+              </a:rPr>
+              <a:t> SUCESSO </a:t>
+            </a:r>
+            <a:r>
+              <a:rPr lang="pt-PT" sz="1200" kern="1200" dirty="0" smtClean="0">
+                <a:solidFill>
+                  <a:schemeClr val="tx1"/>
+                </a:solidFill>
+                <a:effectLst/>
+                <a:latin typeface="+mn-lt"/>
+                <a:ea typeface="+mn-ea"/>
+                <a:cs typeface="+mn-cs"/>
+              </a:rPr>
+              <a:t>escolar. </a:t>
+            </a:r>
+            <a:endParaRPr lang="pt-PT" dirty="0"/>
+          </a:p>
+        </p:txBody>
+      </p:sp>
+      <p:sp>
+        <p:nvSpPr>
+          <p:cNvPr id="4" name="Marcador de Posição da Data 3"/>
+          <p:cNvSpPr>
+            <a:spLocks noGrp="1"/>
+          </p:cNvSpPr>
+          <p:nvPr>
+            <p:ph type="dt" idx="10"/>
+          </p:nvPr>
+        </p:nvSpPr>
+        <p:spPr/>
+        <p:txBody>
+          <a:bodyPr/>
+          <a:lstStyle/>
+          <a:p>
+            <a:fld id="{4CEE548C-493F-4FD1-9ECB-917AA81544ED}" type="datetime1">
+              <a:rPr lang="pt-PT" smtClean="0"/>
+              <a:t>23/03/2015</a:t>
+            </a:fld>
+            <a:endParaRPr lang="pt-PT"/>
+          </a:p>
+        </p:txBody>
+      </p:sp>
+      <p:sp>
+        <p:nvSpPr>
+          <p:cNvPr id="5" name="Marcador de Posição do Número do Diapositivo 4"/>
+          <p:cNvSpPr>
+            <a:spLocks noGrp="1"/>
+          </p:cNvSpPr>
+          <p:nvPr>
+            <p:ph type="sldNum" sz="quarter" idx="11"/>
+          </p:nvPr>
+        </p:nvSpPr>
+        <p:spPr/>
+        <p:txBody>
+          <a:bodyPr/>
+          <a:lstStyle/>
+          <a:p>
+            <a:fld id="{01F2A70B-78F2-4DCF-B53B-C990D2FAFB8A}" type="slidenum">
+              <a:rPr lang="pt-PT" smtClean="0"/>
+              <a:t>6</a:t>
+            </a:fld>
+            <a:endParaRPr lang="pt-PT"/>
+          </a:p>
+        </p:txBody>
+      </p:sp>
+    </p:spTree>
+    <p:extLst>
+      <p:ext uri="{BB962C8B-B14F-4D97-AF65-F5344CB8AC3E}">
+        <p14:creationId xmlns:p14="http://schemas.microsoft.com/office/powerpoint/2010/main" val="1513675098"/>
+      </p:ext>
+    </p:extLst>
+  </p:cSld>
+  <p:clrMapOvr>
+    <a:masterClrMapping/>
+  </p:clrMapOvr>
+</p:notes>
+</file>
+
+<file path=ppt/notesSlides/notesSlide7.xml><?xml version="1.0" encoding="utf-8"?>
+<p:notes xmlns:a="http://schemas.openxmlformats.org/drawingml/2006/main" xmlns:r="http://schemas.openxmlformats.org/officeDocument/2006/relationships" xmlns:p="http://schemas.openxmlformats.org/presentationml/2006/main">
+  <p:cSld>
+    <p:spTree>
+      <p:nvGrpSpPr>
+        <p:cNvPr id="1" name=""/>
+        <p:cNvGrpSpPr/>
+        <p:nvPr/>
+      </p:nvGrpSpPr>
+      <p:grpSpPr>
+        <a:xfrm>
+          <a:off x="0" y="0"/>
+          <a:ext cx="0" cy="0"/>
+          <a:chOff x="0" y="0"/>
+          <a:chExt cx="0" cy="0"/>
+        </a:xfrm>
+      </p:grpSpPr>
+      <p:sp>
+        <p:nvSpPr>
+          <p:cNvPr id="2" name="Marcador de Posição da Imagem do Diapositivo 1"/>
+          <p:cNvSpPr>
+            <a:spLocks noGrp="1" noRot="1" noChangeAspect="1"/>
+          </p:cNvSpPr>
+          <p:nvPr>
+            <p:ph type="sldImg"/>
+          </p:nvPr>
+        </p:nvSpPr>
+        <p:spPr/>
+      </p:sp>
+      <p:sp>
+        <p:nvSpPr>
+          <p:cNvPr id="3" name="Marcador de Posição de Notas 2"/>
+          <p:cNvSpPr>
+            <a:spLocks noGrp="1"/>
+          </p:cNvSpPr>
+          <p:nvPr>
+            <p:ph type="body" idx="1"/>
+          </p:nvPr>
+        </p:nvSpPr>
+        <p:spPr/>
+        <p:txBody>
+          <a:bodyPr/>
+          <a:lstStyle/>
+          <a:p>
+            <a:r>
+              <a:rPr lang="pt-PT" sz="1200" kern="1200" dirty="0" smtClean="0">
+                <a:solidFill>
+                  <a:schemeClr val="tx1"/>
+                </a:solidFill>
+                <a:effectLst/>
+                <a:latin typeface="+mn-lt"/>
+                <a:ea typeface="+mn-ea"/>
+                <a:cs typeface="+mn-cs"/>
+              </a:rPr>
+              <a:t>PERÍMETROS de figuras geométricas e </a:t>
+            </a:r>
+            <a:r>
+              <a:rPr lang="pt-PT" sz="1200" kern="1200" baseline="0" dirty="0" smtClean="0">
+                <a:solidFill>
+                  <a:schemeClr val="tx1"/>
+                </a:solidFill>
+                <a:effectLst/>
+                <a:latin typeface="+mn-lt"/>
+                <a:ea typeface="+mn-ea"/>
+                <a:cs typeface="+mn-cs"/>
+              </a:rPr>
+              <a:t>MEDIDAS.</a:t>
+            </a:r>
+          </a:p>
+          <a:p>
+            <a:pPr marL="0" marR="0" indent="0" algn="l" defTabSz="914400" rtl="0" eaLnBrk="1" fontAlgn="auto" latinLnBrk="0" hangingPunct="1">
+              <a:lnSpc>
+                <a:spcPct val="100000"/>
+              </a:lnSpc>
+              <a:spcBef>
+                <a:spcPts val="0"/>
+              </a:spcBef>
+              <a:spcAft>
+                <a:spcPts val="0"/>
+              </a:spcAft>
+              <a:buClrTx/>
+              <a:buSzTx/>
+              <a:buFontTx/>
+              <a:buNone/>
+              <a:tabLst/>
+              <a:defRPr/>
+            </a:pPr>
+            <a:r>
+              <a:rPr lang="pt-PT" sz="1200" kern="1200" dirty="0" smtClean="0">
+                <a:solidFill>
+                  <a:schemeClr val="tx1"/>
+                </a:solidFill>
+                <a:effectLst/>
+                <a:latin typeface="+mn-lt"/>
+                <a:ea typeface="+mn-ea"/>
+                <a:cs typeface="+mn-cs"/>
+              </a:rPr>
+              <a:t>As AULAS através</a:t>
+            </a:r>
+            <a:r>
+              <a:rPr lang="pt-PT" sz="1200" kern="1200" baseline="0" dirty="0" smtClean="0">
+                <a:solidFill>
+                  <a:schemeClr val="tx1"/>
+                </a:solidFill>
+                <a:effectLst/>
+                <a:latin typeface="+mn-lt"/>
+                <a:ea typeface="+mn-ea"/>
+                <a:cs typeface="+mn-cs"/>
+              </a:rPr>
+              <a:t> de</a:t>
+            </a:r>
+            <a:r>
+              <a:rPr lang="pt-PT" sz="1200" kern="1200" dirty="0" smtClean="0">
+                <a:solidFill>
+                  <a:schemeClr val="tx1"/>
+                </a:solidFill>
+                <a:effectLst/>
+                <a:latin typeface="+mn-lt"/>
+                <a:ea typeface="+mn-ea"/>
+                <a:cs typeface="+mn-cs"/>
+              </a:rPr>
+              <a:t> MULTIMÉDIA.</a:t>
+            </a:r>
+          </a:p>
+          <a:p>
+            <a:r>
+              <a:rPr lang="pt-PT" sz="1200" kern="1200" dirty="0" smtClean="0">
+                <a:solidFill>
+                  <a:schemeClr val="tx1"/>
+                </a:solidFill>
+                <a:effectLst/>
+                <a:latin typeface="+mn-lt"/>
+                <a:ea typeface="+mn-ea"/>
+                <a:cs typeface="+mn-cs"/>
+              </a:rPr>
+              <a:t>Os EXERCÍCIOS e os TESTES dão</a:t>
+            </a:r>
+            <a:r>
+              <a:rPr lang="pt-PT" sz="1200" kern="1200" baseline="0" dirty="0" smtClean="0">
+                <a:solidFill>
+                  <a:schemeClr val="tx1"/>
+                </a:solidFill>
+                <a:effectLst/>
+                <a:latin typeface="+mn-lt"/>
+                <a:ea typeface="+mn-ea"/>
+                <a:cs typeface="+mn-cs"/>
+              </a:rPr>
+              <a:t> NOÇÃO.</a:t>
+            </a:r>
+            <a:endParaRPr lang="pt-PT" sz="1200" kern="1200" dirty="0" smtClean="0">
+              <a:solidFill>
+                <a:schemeClr val="tx1"/>
+              </a:solidFill>
+              <a:effectLst/>
+              <a:latin typeface="+mn-lt"/>
+              <a:ea typeface="+mn-ea"/>
+              <a:cs typeface="+mn-cs"/>
+            </a:endParaRPr>
+          </a:p>
+          <a:p>
+            <a:pPr marL="0" marR="0" indent="0" algn="l" defTabSz="914400" rtl="0" eaLnBrk="1" fontAlgn="auto" latinLnBrk="0" hangingPunct="1">
+              <a:lnSpc>
+                <a:spcPct val="100000"/>
+              </a:lnSpc>
+              <a:spcBef>
+                <a:spcPts val="0"/>
+              </a:spcBef>
+              <a:spcAft>
+                <a:spcPts val="0"/>
+              </a:spcAft>
+              <a:buClrTx/>
+              <a:buSzTx/>
+              <a:buFontTx/>
+              <a:buNone/>
+              <a:tabLst/>
+              <a:defRPr/>
+            </a:pPr>
+            <a:r>
+              <a:rPr lang="pt-PT" sz="1200" kern="1200" dirty="0" smtClean="0">
+                <a:solidFill>
+                  <a:schemeClr val="tx1"/>
+                </a:solidFill>
+                <a:effectLst/>
+                <a:latin typeface="+mn-lt"/>
+                <a:ea typeface="+mn-ea"/>
+                <a:cs typeface="+mn-cs"/>
+              </a:rPr>
+              <a:t>Exercícios e testes NIVEIS DE DIFICULDADE, sendo que os MAIS AVANÇADOS só estarão acessíveis quando o aluno</a:t>
+            </a:r>
+            <a:r>
+              <a:rPr lang="pt-PT" sz="1200" kern="1200" baseline="0" dirty="0" smtClean="0">
+                <a:solidFill>
+                  <a:schemeClr val="tx1"/>
+                </a:solidFill>
+                <a:effectLst/>
+                <a:latin typeface="+mn-lt"/>
+                <a:ea typeface="+mn-ea"/>
+                <a:cs typeface="+mn-cs"/>
+              </a:rPr>
+              <a:t> estiver </a:t>
+            </a:r>
+            <a:r>
+              <a:rPr lang="pt-PT" sz="1200" kern="1200" dirty="0" smtClean="0">
+                <a:solidFill>
+                  <a:schemeClr val="tx1"/>
+                </a:solidFill>
+                <a:effectLst/>
+                <a:latin typeface="+mn-lt"/>
+                <a:ea typeface="+mn-ea"/>
+                <a:cs typeface="+mn-cs"/>
+              </a:rPr>
+              <a:t>BEM PREPARAD</a:t>
+            </a:r>
+            <a:r>
+              <a:rPr lang="pt-PT" sz="1200" kern="1200" baseline="0" dirty="0" smtClean="0">
+                <a:solidFill>
+                  <a:schemeClr val="tx1"/>
+                </a:solidFill>
+                <a:effectLst/>
+                <a:latin typeface="+mn-lt"/>
+                <a:ea typeface="+mn-ea"/>
+                <a:cs typeface="+mn-cs"/>
+              </a:rPr>
+              <a:t>O.</a:t>
+            </a:r>
+            <a:endParaRPr lang="pt-PT" sz="1200" kern="1200" dirty="0" smtClean="0">
+              <a:solidFill>
+                <a:schemeClr val="tx1"/>
+              </a:solidFill>
+              <a:effectLst/>
+              <a:latin typeface="+mn-lt"/>
+              <a:ea typeface="+mn-ea"/>
+              <a:cs typeface="+mn-cs"/>
+            </a:endParaRPr>
+          </a:p>
+          <a:p>
+            <a:r>
+              <a:rPr lang="pt-PT" sz="1200" kern="1200" dirty="0" smtClean="0">
+                <a:solidFill>
+                  <a:schemeClr val="tx1"/>
+                </a:solidFill>
+                <a:effectLst/>
+                <a:latin typeface="+mn-lt"/>
+                <a:ea typeface="+mn-ea"/>
+                <a:cs typeface="+mn-cs"/>
+              </a:rPr>
+              <a:t>O sistema disponibiliza PROGRESSO</a:t>
+            </a:r>
+            <a:r>
+              <a:rPr lang="pt-PT" sz="1200" kern="1200" baseline="0" dirty="0" smtClean="0">
+                <a:solidFill>
+                  <a:schemeClr val="tx1"/>
+                </a:solidFill>
+                <a:effectLst/>
+                <a:latin typeface="+mn-lt"/>
+                <a:ea typeface="+mn-ea"/>
+                <a:cs typeface="+mn-cs"/>
+              </a:rPr>
+              <a:t> do utilizador</a:t>
+            </a:r>
+            <a:r>
+              <a:rPr lang="pt-PT" sz="1200" kern="1200" dirty="0" smtClean="0">
+                <a:solidFill>
+                  <a:schemeClr val="tx1"/>
+                </a:solidFill>
+                <a:effectLst/>
+                <a:latin typeface="+mn-lt"/>
+                <a:ea typeface="+mn-ea"/>
+                <a:cs typeface="+mn-cs"/>
+              </a:rPr>
+              <a:t> </a:t>
+            </a:r>
+            <a:endParaRPr lang="pt-PT" dirty="0"/>
+          </a:p>
+        </p:txBody>
+      </p:sp>
+      <p:sp>
+        <p:nvSpPr>
+          <p:cNvPr id="4" name="Marcador de Posição da Data 3"/>
+          <p:cNvSpPr>
+            <a:spLocks noGrp="1"/>
+          </p:cNvSpPr>
+          <p:nvPr>
+            <p:ph type="dt" idx="10"/>
+          </p:nvPr>
+        </p:nvSpPr>
+        <p:spPr/>
+        <p:txBody>
+          <a:bodyPr/>
+          <a:lstStyle/>
+          <a:p>
+            <a:fld id="{4CEE548C-493F-4FD1-9ECB-917AA81544ED}" type="datetime1">
+              <a:rPr lang="pt-PT" smtClean="0"/>
+              <a:t>23/03/2015</a:t>
+            </a:fld>
+            <a:endParaRPr lang="pt-PT"/>
+          </a:p>
+        </p:txBody>
+      </p:sp>
+      <p:sp>
+        <p:nvSpPr>
+          <p:cNvPr id="5" name="Marcador de Posição do Número do Diapositivo 4"/>
+          <p:cNvSpPr>
+            <a:spLocks noGrp="1"/>
+          </p:cNvSpPr>
+          <p:nvPr>
+            <p:ph type="sldNum" sz="quarter" idx="11"/>
+          </p:nvPr>
+        </p:nvSpPr>
+        <p:spPr/>
+        <p:txBody>
+          <a:bodyPr/>
+          <a:lstStyle/>
+          <a:p>
+            <a:fld id="{01F2A70B-78F2-4DCF-B53B-C990D2FAFB8A}" type="slidenum">
+              <a:rPr lang="pt-PT" smtClean="0"/>
+              <a:t>7</a:t>
+            </a:fld>
+            <a:endParaRPr lang="pt-PT"/>
+          </a:p>
+        </p:txBody>
+      </p:sp>
+    </p:spTree>
+    <p:extLst>
+      <p:ext uri="{BB962C8B-B14F-4D97-AF65-F5344CB8AC3E}">
+        <p14:creationId xmlns:p14="http://schemas.microsoft.com/office/powerpoint/2010/main" val="2460270616"/>
+      </p:ext>
+    </p:extLst>
+  </p:cSld>
+  <p:clrMapOvr>
+    <a:masterClrMapping/>
+  </p:clrMapOvr>
+</p:notes>
+</file>
+
+<file path=ppt/notesSlides/notesSlide8.xml><?xml version="1.0" encoding="utf-8"?>
+<p:notes xmlns:a="http://schemas.openxmlformats.org/drawingml/2006/main" xmlns:r="http://schemas.openxmlformats.org/officeDocument/2006/relationships" xmlns:p="http://schemas.openxmlformats.org/presentationml/2006/main">
+  <p:cSld>
+    <p:spTree>
+      <p:nvGrpSpPr>
+        <p:cNvPr id="1" name=""/>
+        <p:cNvGrpSpPr/>
+        <p:nvPr/>
+      </p:nvGrpSpPr>
+      <p:grpSpPr>
+        <a:xfrm>
+          <a:off x="0" y="0"/>
+          <a:ext cx="0" cy="0"/>
+          <a:chOff x="0" y="0"/>
+          <a:chExt cx="0" cy="0"/>
+        </a:xfrm>
+      </p:grpSpPr>
+      <p:sp>
+        <p:nvSpPr>
+          <p:cNvPr id="2" name="Marcador de Posição da Imagem do Diapositivo 1"/>
+          <p:cNvSpPr>
+            <a:spLocks noGrp="1" noRot="1" noChangeAspect="1"/>
+          </p:cNvSpPr>
+          <p:nvPr>
+            <p:ph type="sldImg"/>
+          </p:nvPr>
+        </p:nvSpPr>
+        <p:spPr/>
+      </p:sp>
+      <p:sp>
+        <p:nvSpPr>
+          <p:cNvPr id="3" name="Marcador de Posição de Notas 2"/>
+          <p:cNvSpPr>
+            <a:spLocks noGrp="1"/>
+          </p:cNvSpPr>
+          <p:nvPr>
+            <p:ph type="body" idx="1"/>
+          </p:nvPr>
+        </p:nvSpPr>
+        <p:spPr/>
+        <p:txBody>
+          <a:bodyPr/>
+          <a:lstStyle/>
+          <a:p>
+            <a:endParaRPr lang="pt-PT" dirty="0"/>
+          </a:p>
+        </p:txBody>
+      </p:sp>
+      <p:sp>
+        <p:nvSpPr>
+          <p:cNvPr id="4" name="Marcador de Posição da Data 3"/>
+          <p:cNvSpPr>
+            <a:spLocks noGrp="1"/>
+          </p:cNvSpPr>
+          <p:nvPr>
+            <p:ph type="dt" idx="10"/>
+          </p:nvPr>
+        </p:nvSpPr>
+        <p:spPr/>
+        <p:txBody>
+          <a:bodyPr/>
+          <a:lstStyle/>
+          <a:p>
+            <a:fld id="{4CEE548C-493F-4FD1-9ECB-917AA81544ED}" type="datetime1">
+              <a:rPr lang="pt-PT" smtClean="0"/>
+              <a:t>23/03/2015</a:t>
+            </a:fld>
+            <a:endParaRPr lang="pt-PT"/>
+          </a:p>
+        </p:txBody>
+      </p:sp>
+      <p:sp>
+        <p:nvSpPr>
+          <p:cNvPr id="5" name="Marcador de Posição do Número do Diapositivo 4"/>
+          <p:cNvSpPr>
+            <a:spLocks noGrp="1"/>
+          </p:cNvSpPr>
+          <p:nvPr>
+            <p:ph type="sldNum" sz="quarter" idx="11"/>
+          </p:nvPr>
+        </p:nvSpPr>
+        <p:spPr/>
+        <p:txBody>
+          <a:bodyPr/>
+          <a:lstStyle/>
+          <a:p>
+            <a:fld id="{01F2A70B-78F2-4DCF-B53B-C990D2FAFB8A}" type="slidenum">
+              <a:rPr lang="pt-PT" smtClean="0"/>
+              <a:t>8</a:t>
+            </a:fld>
+            <a:endParaRPr lang="pt-PT"/>
+          </a:p>
+        </p:txBody>
+      </p:sp>
+    </p:spTree>
+    <p:extLst>
+      <p:ext uri="{BB962C8B-B14F-4D97-AF65-F5344CB8AC3E}">
+        <p14:creationId xmlns:p14="http://schemas.microsoft.com/office/powerpoint/2010/main" val="2816242835"/>
+      </p:ext>
+    </p:extLst>
+  </p:cSld>
+  <p:clrMapOvr>
+    <a:masterClrMapping/>
+  </p:clrMapOvr>
+</p:notes>
+</file>
+
+<file path=ppt/notesSlides/notesSlide9.xml><?xml version="1.0" encoding="utf-8"?>
+<p:notes xmlns:a="http://schemas.openxmlformats.org/drawingml/2006/main" xmlns:r="http://schemas.openxmlformats.org/officeDocument/2006/relationships" xmlns:p="http://schemas.openxmlformats.org/presentationml/2006/main">
+  <p:cSld>
+    <p:spTree>
+      <p:nvGrpSpPr>
+        <p:cNvPr id="1" name=""/>
+        <p:cNvGrpSpPr/>
+        <p:nvPr/>
+      </p:nvGrpSpPr>
+      <p:grpSpPr>
+        <a:xfrm>
+          <a:off x="0" y="0"/>
+          <a:ext cx="0" cy="0"/>
+          <a:chOff x="0" y="0"/>
+          <a:chExt cx="0" cy="0"/>
+        </a:xfrm>
+      </p:grpSpPr>
+      <p:sp>
+        <p:nvSpPr>
+          <p:cNvPr id="2" name="Marcador de Posição da Imagem do Diapositivo 1"/>
+          <p:cNvSpPr>
+            <a:spLocks noGrp="1" noRot="1" noChangeAspect="1"/>
+          </p:cNvSpPr>
+          <p:nvPr>
+            <p:ph type="sldImg"/>
+          </p:nvPr>
+        </p:nvSpPr>
+        <p:spPr/>
+      </p:sp>
+      <p:sp>
+        <p:nvSpPr>
+          <p:cNvPr id="3" name="Marcador de Posição de Notas 2"/>
+          <p:cNvSpPr>
+            <a:spLocks noGrp="1"/>
+          </p:cNvSpPr>
+          <p:nvPr>
+            <p:ph type="body" idx="1"/>
+          </p:nvPr>
+        </p:nvSpPr>
+        <p:spPr/>
+        <p:txBody>
+          <a:bodyPr/>
+          <a:lstStyle/>
+          <a:p>
+            <a:pPr marL="0" marR="0" indent="0" algn="l" defTabSz="914400" rtl="0" eaLnBrk="1" fontAlgn="auto" latinLnBrk="0" hangingPunct="1">
+              <a:lnSpc>
+                <a:spcPct val="100000"/>
+              </a:lnSpc>
+              <a:spcBef>
+                <a:spcPts val="0"/>
+              </a:spcBef>
+              <a:spcAft>
+                <a:spcPts val="0"/>
+              </a:spcAft>
+              <a:buClrTx/>
+              <a:buSzTx/>
+              <a:buFontTx/>
+              <a:buNone/>
+              <a:tabLst/>
+              <a:defRPr/>
+            </a:pPr>
+            <a:r>
+              <a:rPr lang="pt-PT" sz="1200" kern="1200" dirty="0" smtClean="0">
+                <a:solidFill>
+                  <a:schemeClr val="tx1"/>
+                </a:solidFill>
+                <a:effectLst/>
+                <a:latin typeface="+mn-lt"/>
+                <a:ea typeface="+mn-ea"/>
+                <a:cs typeface="+mn-cs"/>
+              </a:rPr>
+              <a:t>Esboço do que achamos que poderá ser a INTERFACE</a:t>
+            </a:r>
+            <a:r>
+              <a:rPr lang="pt-PT" sz="1200" kern="1200" baseline="0" dirty="0" smtClean="0">
+                <a:solidFill>
+                  <a:schemeClr val="tx1"/>
+                </a:solidFill>
+                <a:effectLst/>
+                <a:latin typeface="+mn-lt"/>
+                <a:ea typeface="+mn-ea"/>
+                <a:cs typeface="+mn-cs"/>
+              </a:rPr>
+              <a:t> </a:t>
+            </a:r>
+            <a:r>
+              <a:rPr lang="pt-PT" sz="1200" kern="1200" dirty="0" smtClean="0">
+                <a:solidFill>
+                  <a:schemeClr val="tx1"/>
+                </a:solidFill>
+                <a:effectLst/>
+                <a:latin typeface="+mn-lt"/>
+                <a:ea typeface="+mn-ea"/>
+                <a:cs typeface="+mn-cs"/>
+              </a:rPr>
+              <a:t>do nosso Assistente Pedagógico</a:t>
+            </a:r>
+            <a:endParaRPr lang="pt-PT" dirty="0" smtClean="0"/>
+          </a:p>
+          <a:p>
+            <a:r>
+              <a:rPr lang="pt-PT" sz="1200" kern="1200" dirty="0" smtClean="0">
+                <a:solidFill>
+                  <a:schemeClr val="tx1"/>
+                </a:solidFill>
+                <a:effectLst/>
+                <a:latin typeface="+mn-lt"/>
+                <a:ea typeface="+mn-ea"/>
+                <a:cs typeface="+mn-cs"/>
+              </a:rPr>
+              <a:t>Figura bastante conhecida das crianças:</a:t>
+            </a:r>
+            <a:r>
+              <a:rPr lang="pt-PT" sz="1200" kern="1200" baseline="0" dirty="0" smtClean="0">
+                <a:solidFill>
+                  <a:schemeClr val="tx1"/>
+                </a:solidFill>
+                <a:effectLst/>
+                <a:latin typeface="+mn-lt"/>
+                <a:ea typeface="+mn-ea"/>
+                <a:cs typeface="+mn-cs"/>
+              </a:rPr>
+              <a:t> o nosso tutor </a:t>
+            </a:r>
+            <a:r>
+              <a:rPr lang="pt-PT" sz="1200" i="1" kern="1200" dirty="0" err="1" smtClean="0">
+                <a:solidFill>
+                  <a:schemeClr val="tx1"/>
+                </a:solidFill>
+                <a:effectLst/>
+                <a:latin typeface="+mn-lt"/>
+                <a:ea typeface="+mn-ea"/>
+                <a:cs typeface="+mn-cs"/>
+              </a:rPr>
+              <a:t>Minion</a:t>
+            </a:r>
+            <a:endParaRPr lang="pt-PT" sz="1200" i="1" kern="1200" dirty="0" smtClean="0">
+              <a:solidFill>
+                <a:schemeClr val="tx1"/>
+              </a:solidFill>
+              <a:effectLst/>
+              <a:latin typeface="+mn-lt"/>
+              <a:ea typeface="+mn-ea"/>
+              <a:cs typeface="+mn-cs"/>
+            </a:endParaRPr>
+          </a:p>
+          <a:p>
+            <a:pPr marL="0" marR="0" indent="0" algn="l" defTabSz="914400" rtl="0" eaLnBrk="1" fontAlgn="auto" latinLnBrk="0" hangingPunct="1">
+              <a:lnSpc>
+                <a:spcPct val="100000"/>
+              </a:lnSpc>
+              <a:spcBef>
+                <a:spcPts val="0"/>
+              </a:spcBef>
+              <a:spcAft>
+                <a:spcPts val="0"/>
+              </a:spcAft>
+              <a:buClrTx/>
+              <a:buSzTx/>
+              <a:buFontTx/>
+              <a:buNone/>
+              <a:tabLst/>
+              <a:defRPr/>
+            </a:pPr>
+            <a:r>
+              <a:rPr lang="pt-PT" sz="1200" kern="1200" dirty="0" smtClean="0">
+                <a:solidFill>
+                  <a:schemeClr val="tx1"/>
+                </a:solidFill>
+                <a:effectLst/>
+                <a:latin typeface="+mn-lt"/>
+                <a:ea typeface="+mn-ea"/>
+                <a:cs typeface="+mn-cs"/>
+              </a:rPr>
+              <a:t>Mais FÁCIL CATIVAR os mais PEQUENOS.</a:t>
+            </a:r>
+          </a:p>
+          <a:p>
+            <a:endParaRPr lang="pt-PT" dirty="0"/>
+          </a:p>
+        </p:txBody>
+      </p:sp>
+      <p:sp>
+        <p:nvSpPr>
+          <p:cNvPr id="4" name="Marcador de Posição da Data 3"/>
+          <p:cNvSpPr>
+            <a:spLocks noGrp="1"/>
+          </p:cNvSpPr>
+          <p:nvPr>
+            <p:ph type="dt" idx="10"/>
+          </p:nvPr>
+        </p:nvSpPr>
+        <p:spPr/>
+        <p:txBody>
+          <a:bodyPr/>
+          <a:lstStyle/>
+          <a:p>
+            <a:fld id="{4CEE548C-493F-4FD1-9ECB-917AA81544ED}" type="datetime1">
+              <a:rPr lang="pt-PT" smtClean="0"/>
+              <a:t>23/03/2015</a:t>
+            </a:fld>
+            <a:endParaRPr lang="pt-PT"/>
+          </a:p>
+        </p:txBody>
+      </p:sp>
+      <p:sp>
+        <p:nvSpPr>
+          <p:cNvPr id="5" name="Marcador de Posição do Número do Diapositivo 4"/>
+          <p:cNvSpPr>
+            <a:spLocks noGrp="1"/>
+          </p:cNvSpPr>
+          <p:nvPr>
+            <p:ph type="sldNum" sz="quarter" idx="11"/>
+          </p:nvPr>
+        </p:nvSpPr>
+        <p:spPr/>
+        <p:txBody>
+          <a:bodyPr/>
+          <a:lstStyle/>
+          <a:p>
+            <a:fld id="{01F2A70B-78F2-4DCF-B53B-C990D2FAFB8A}" type="slidenum">
+              <a:rPr lang="pt-PT" smtClean="0"/>
+              <a:t>9</a:t>
+            </a:fld>
+            <a:endParaRPr lang="pt-PT"/>
+          </a:p>
+        </p:txBody>
+      </p:sp>
+    </p:spTree>
+    <p:extLst>
+      <p:ext uri="{BB962C8B-B14F-4D97-AF65-F5344CB8AC3E}">
+        <p14:creationId xmlns:p14="http://schemas.microsoft.com/office/powerpoint/2010/main" val="2957719370"/>
       </p:ext>
     </p:extLst>
   </p:cSld>
@@ -8955,17 +10419,20 @@
         </p:nvSpPr>
         <p:spPr>
           <a:xfrm>
-            <a:off x="333772" y="4725144"/>
-            <a:ext cx="4392488" cy="1512168"/>
+            <a:off x="131873" y="4437112"/>
+            <a:ext cx="4392488" cy="1800200"/>
           </a:xfrm>
         </p:spPr>
         <p:txBody>
           <a:bodyPr>
-            <a:normAutofit fontScale="85000" lnSpcReduction="20000"/>
+            <a:normAutofit fontScale="77500" lnSpcReduction="20000"/>
           </a:bodyPr>
           <a:lstStyle/>
           <a:p>
             <a:pPr marL="0" indent="0" algn="l">
+              <a:lnSpc>
+                <a:spcPct val="120000"/>
+              </a:lnSpc>
               <a:spcBef>
                 <a:spcPts val="0"/>
               </a:spcBef>
@@ -8983,6 +10450,9 @@
           </a:p>
           <a:p>
             <a:pPr marL="0" indent="0" algn="l">
+              <a:lnSpc>
+                <a:spcPct val="120000"/>
+              </a:lnSpc>
               <a:spcBef>
                 <a:spcPts val="0"/>
               </a:spcBef>
@@ -9000,6 +10470,9 @@
           </a:p>
           <a:p>
             <a:pPr marL="0" indent="0" algn="l">
+              <a:lnSpc>
+                <a:spcPct val="120000"/>
+              </a:lnSpc>
               <a:spcBef>
                 <a:spcPts val="0"/>
               </a:spcBef>
@@ -9017,6 +10490,9 @@
           </a:p>
           <a:p>
             <a:pPr marL="0" indent="0" algn="l">
+              <a:lnSpc>
+                <a:spcPct val="120000"/>
+              </a:lnSpc>
               <a:spcBef>
                 <a:spcPts val="0"/>
               </a:spcBef>
@@ -9034,6 +10510,9 @@
           </a:p>
           <a:p>
             <a:pPr marL="0" indent="0" algn="l">
+              <a:lnSpc>
+                <a:spcPct val="120000"/>
+              </a:lnSpc>
               <a:spcBef>
                 <a:spcPts val="0"/>
               </a:spcBef>
@@ -9074,7 +10553,7 @@
         </p:nvSpPr>
         <p:spPr>
           <a:xfrm>
-            <a:off x="7570576" y="4940028"/>
+            <a:off x="7402296" y="4437112"/>
             <a:ext cx="4104456" cy="1089529"/>
           </a:xfrm>
           <a:prstGeom prst="rect">
@@ -9467,17 +10946,20 @@
         </p:nvSpPr>
         <p:spPr>
           <a:xfrm>
-            <a:off x="333772" y="4725144"/>
-            <a:ext cx="4392488" cy="1512168"/>
+            <a:off x="288032" y="4517388"/>
+            <a:ext cx="4392488" cy="1759759"/>
           </a:xfrm>
         </p:spPr>
         <p:txBody>
           <a:bodyPr>
-            <a:normAutofit fontScale="85000" lnSpcReduction="20000"/>
+            <a:normAutofit fontScale="77500" lnSpcReduction="20000"/>
           </a:bodyPr>
           <a:lstStyle/>
           <a:p>
             <a:pPr marL="0" indent="0" algn="l">
+              <a:lnSpc>
+                <a:spcPct val="120000"/>
+              </a:lnSpc>
               <a:spcBef>
                 <a:spcPts val="0"/>
               </a:spcBef>
@@ -9495,6 +10977,9 @@
           </a:p>
           <a:p>
             <a:pPr marL="0" indent="0" algn="l">
+              <a:lnSpc>
+                <a:spcPct val="120000"/>
+              </a:lnSpc>
               <a:spcBef>
                 <a:spcPts val="0"/>
               </a:spcBef>
@@ -9512,6 +10997,9 @@
           </a:p>
           <a:p>
             <a:pPr marL="0" indent="0" algn="l">
+              <a:lnSpc>
+                <a:spcPct val="120000"/>
+              </a:lnSpc>
               <a:spcBef>
                 <a:spcPts val="0"/>
               </a:spcBef>
@@ -9529,6 +11017,9 @@
           </a:p>
           <a:p>
             <a:pPr marL="0" indent="0" algn="l">
+              <a:lnSpc>
+                <a:spcPct val="120000"/>
+              </a:lnSpc>
               <a:spcBef>
                 <a:spcPts val="0"/>
               </a:spcBef>
@@ -9546,6 +11037,9 @@
           </a:p>
           <a:p>
             <a:pPr marL="0" indent="0" algn="l">
+              <a:lnSpc>
+                <a:spcPct val="120000"/>
+              </a:lnSpc>
               <a:spcBef>
                 <a:spcPts val="0"/>
               </a:spcBef>
@@ -9586,7 +11080,7 @@
         </p:nvSpPr>
         <p:spPr>
           <a:xfrm>
-            <a:off x="7570576" y="4940028"/>
+            <a:off x="7406208" y="4499711"/>
             <a:ext cx="4104456" cy="1089529"/>
           </a:xfrm>
           <a:prstGeom prst="rect">
@@ -10538,7 +12032,7 @@
             <p:nvPr/>
           </p:nvPicPr>
           <p:blipFill>
-            <a:blip r:embed="rId2" cstate="print">
+            <a:blip r:embed="rId3" cstate="print">
               <a:extLst>
                 <a:ext uri="{28A0092B-C50C-407E-A947-70E740481C1C}">
                   <a14:useLocalDpi xmlns:a14="http://schemas.microsoft.com/office/drawing/2010/main" val="0"/>
@@ -10874,7 +12368,7 @@
             <p:nvPr/>
           </p:nvPicPr>
           <p:blipFill>
-            <a:blip r:embed="rId2" cstate="print">
+            <a:blip r:embed="rId3" cstate="print">
               <a:extLst>
                 <a:ext uri="{28A0092B-C50C-407E-A947-70E740481C1C}">
                   <a14:useLocalDpi xmlns:a14="http://schemas.microsoft.com/office/drawing/2010/main" val="0"/>
@@ -11216,7 +12710,7 @@
             <p:nvPr/>
           </p:nvPicPr>
           <p:blipFill>
-            <a:blip r:embed="rId2" cstate="print">
+            <a:blip r:embed="rId3" cstate="print">
               <a:extLst>
                 <a:ext uri="{28A0092B-C50C-407E-A947-70E740481C1C}">
                   <a14:useLocalDpi xmlns:a14="http://schemas.microsoft.com/office/drawing/2010/main" val="0"/>
@@ -11550,7 +13044,7 @@
             <p:nvPr/>
           </p:nvPicPr>
           <p:blipFill>
-            <a:blip r:embed="rId2" cstate="print">
+            <a:blip r:embed="rId3" cstate="print">
               <a:extLst>
                 <a:ext uri="{28A0092B-C50C-407E-A947-70E740481C1C}">
                   <a14:useLocalDpi xmlns:a14="http://schemas.microsoft.com/office/drawing/2010/main" val="0"/>
@@ -11693,7 +13187,7 @@
         </p:xfrm>
         <a:graphic>
           <a:graphicData uri="http://schemas.openxmlformats.org/drawingml/2006/diagram">
-            <dgm:relIds xmlns:dgm="http://schemas.openxmlformats.org/drawingml/2006/diagram" xmlns:r="http://schemas.openxmlformats.org/officeDocument/2006/relationships" r:dm="rId2" r:lo="rId3" r:qs="rId4" r:cs="rId5"/>
+            <dgm:relIds xmlns:dgm="http://schemas.openxmlformats.org/drawingml/2006/diagram" xmlns:r="http://schemas.openxmlformats.org/officeDocument/2006/relationships" r:dm="rId3" r:lo="rId4" r:qs="rId5" r:cs="rId6"/>
           </a:graphicData>
         </a:graphic>
       </p:graphicFrame>
@@ -11849,7 +13343,7 @@
             <p:nvPr/>
           </p:nvPicPr>
           <p:blipFill>
-            <a:blip r:embed="rId7" cstate="print">
+            <a:blip r:embed="rId8" cstate="print">
               <a:extLst>
                 <a:ext uri="{28A0092B-C50C-407E-A947-70E740481C1C}">
                   <a14:useLocalDpi xmlns:a14="http://schemas.microsoft.com/office/drawing/2010/main" val="0"/>
@@ -11982,7 +13476,7 @@
           </p:nvPr>
         </p:nvPicPr>
         <p:blipFill>
-          <a:blip r:embed="rId2">
+          <a:blip r:embed="rId3">
             <a:extLst>
               <a:ext uri="{28A0092B-C50C-407E-A947-70E740481C1C}">
                 <a14:useLocalDpi xmlns:a14="http://schemas.microsoft.com/office/drawing/2010/main" val="0"/>
@@ -12152,7 +13646,7 @@
             <p:nvPr/>
           </p:nvPicPr>
           <p:blipFill>
-            <a:blip r:embed="rId3" cstate="print">
+            <a:blip r:embed="rId4" cstate="print">
               <a:extLst>
                 <a:ext uri="{28A0092B-C50C-407E-A947-70E740481C1C}">
                   <a14:useLocalDpi xmlns:a14="http://schemas.microsoft.com/office/drawing/2010/main" val="0"/>
@@ -12426,7 +13920,7 @@
             <p:nvPr/>
           </p:nvPicPr>
           <p:blipFill>
-            <a:blip r:embed="rId2" cstate="print">
+            <a:blip r:embed="rId3" cstate="print">
               <a:extLst>
                 <a:ext uri="{28A0092B-C50C-407E-A947-70E740481C1C}">
                   <a14:useLocalDpi xmlns:a14="http://schemas.microsoft.com/office/drawing/2010/main" val="0"/>
@@ -12457,7 +13951,7 @@
           <p:nvPr/>
         </p:nvPicPr>
         <p:blipFill>
-          <a:blip r:embed="rId3">
+          <a:blip r:embed="rId4">
             <a:extLst>
               <a:ext uri="{28A0092B-C50C-407E-A947-70E740481C1C}">
                 <a14:useLocalDpi xmlns:a14="http://schemas.microsoft.com/office/drawing/2010/main" val="0"/>
@@ -12487,7 +13981,7 @@
           <p:nvPr/>
         </p:nvPicPr>
         <p:blipFill>
-          <a:blip r:embed="rId4">
+          <a:blip r:embed="rId5">
             <a:extLst>
               <a:ext uri="{28A0092B-C50C-407E-A947-70E740481C1C}">
                 <a14:useLocalDpi xmlns:a14="http://schemas.microsoft.com/office/drawing/2010/main" val="0"/>
@@ -12517,7 +14011,7 @@
           <p:nvPr/>
         </p:nvPicPr>
         <p:blipFill>
-          <a:blip r:embed="rId5">
+          <a:blip r:embed="rId6">
             <a:extLst>
               <a:ext uri="{28A0092B-C50C-407E-A947-70E740481C1C}">
                 <a14:useLocalDpi xmlns:a14="http://schemas.microsoft.com/office/drawing/2010/main" val="0"/>
@@ -12547,7 +14041,7 @@
           <p:nvPr/>
         </p:nvPicPr>
         <p:blipFill>
-          <a:blip r:embed="rId6">
+          <a:blip r:embed="rId7">
             <a:extLst>
               <a:ext uri="{28A0092B-C50C-407E-A947-70E740481C1C}">
                 <a14:useLocalDpi xmlns:a14="http://schemas.microsoft.com/office/drawing/2010/main" val="0"/>
@@ -12577,7 +14071,7 @@
           <p:nvPr/>
         </p:nvPicPr>
         <p:blipFill>
-          <a:blip r:embed="rId7">
+          <a:blip r:embed="rId8">
             <a:extLst>
               <a:ext uri="{28A0092B-C50C-407E-A947-70E740481C1C}">
                 <a14:useLocalDpi xmlns:a14="http://schemas.microsoft.com/office/drawing/2010/main" val="0"/>

</xml_diff>